<commit_message>
pairwise single node training on all 10 patients
</commit_message>
<xml_diff>
--- a/pair_wise_summary.pptx
+++ b/pair_wise_summary.pptx
@@ -108,6 +108,11 @@
       </a:defRPr>
     </a:lvl9pPr>
   </p:defaultTextStyle>
+  <p:extLst>
+    <p:ext uri="{EFAFB233-063F-42B5-8137-9DF3F51BA10A}">
+      <p15:sldGuideLst xmlns:p15="http://schemas.microsoft.com/office/powerpoint/2012/main"/>
+    </p:ext>
+  </p:extLst>
 </p:presentation>
 </file>
 
@@ -3397,7 +3402,7 @@
         </p:blipFill>
         <p:spPr>
           <a:xfrm>
-            <a:off x="76201" y="1309143"/>
+            <a:off x="78037" y="1146220"/>
             <a:ext cx="5736771" cy="4589417"/>
           </a:xfrm>
           <a:prstGeom prst="rect">
@@ -3427,7 +3432,7 @@
         </p:blipFill>
         <p:spPr>
           <a:xfrm>
-            <a:off x="5739491" y="959440"/>
+            <a:off x="5737655" y="1106794"/>
             <a:ext cx="6376308" cy="5101046"/>
           </a:xfrm>
           <a:prstGeom prst="rect">
@@ -4155,7 +4160,7 @@
           <a:p>
             <a:r>
               <a:rPr lang="en-US" dirty="0"/>
-              <a:t>272 :(</a:t>
+              <a:t>239 :(</a:t>
             </a:r>
           </a:p>
         </p:txBody>

</xml_diff>